<commit_message>
converted notebooks from jupyter to markdown and finialzed predictive model on which traits are most important
</commit_message>
<xml_diff>
--- a/data/TreeGrowth_Geometry.pptx
+++ b/data/TreeGrowth_Geometry.pptx
@@ -113,6 +113,43 @@
 </p:presentation>
 </file>
 
+<file path=ppt/revisionInfo.xml><?xml version="1.0" encoding="utf-8"?>
+<p1510:revInfo xmlns:a="http://schemas.openxmlformats.org/drawingml/2006/main" xmlns:r="http://schemas.openxmlformats.org/officeDocument/2006/relationships" xmlns:p1510="http://schemas.microsoft.com/office/powerpoint/2015/10/main">
+  <p1510:revLst>
+    <p1510:client id="{34BC5812-B499-410C-BF28-BA78F0519BE5}" v="4" dt="2020-10-12T22:26:19.275"/>
+  </p1510:revLst>
+</p1510:revInfo>
+</file>
+
+<file path=ppt/changesInfos/changesInfo1.xml><?xml version="1.0" encoding="utf-8"?>
+<pc:chgInfo xmlns:a="http://schemas.openxmlformats.org/drawingml/2006/main" xmlns:r="http://schemas.openxmlformats.org/officeDocument/2006/relationships" xmlns:ac="http://schemas.microsoft.com/office/drawing/2013/main/command" xmlns:pc="http://schemas.microsoft.com/office/powerpoint/2013/main/command">
+  <pc:docChgLst>
+    <pc:chgData name="Jody Daniel" userId="704939774605efb9" providerId="LiveId" clId="{34BC5812-B499-410C-BF28-BA78F0519BE5}"/>
+    <pc:docChg chg="modSld">
+      <pc:chgData name="Jody Daniel" userId="704939774605efb9" providerId="LiveId" clId="{34BC5812-B499-410C-BF28-BA78F0519BE5}" dt="2020-10-12T22:26:19.275" v="4" actId="20577"/>
+      <pc:docMkLst>
+        <pc:docMk/>
+      </pc:docMkLst>
+      <pc:sldChg chg="modSp mod">
+        <pc:chgData name="Jody Daniel" userId="704939774605efb9" providerId="LiveId" clId="{34BC5812-B499-410C-BF28-BA78F0519BE5}" dt="2020-10-12T22:26:19.275" v="4" actId="20577"/>
+        <pc:sldMkLst>
+          <pc:docMk/>
+          <pc:sldMk cId="1841269621" sldId="256"/>
+        </pc:sldMkLst>
+        <pc:spChg chg="mod">
+          <ac:chgData name="Jody Daniel" userId="704939774605efb9" providerId="LiveId" clId="{34BC5812-B499-410C-BF28-BA78F0519BE5}" dt="2020-10-12T22:26:19.275" v="4" actId="20577"/>
+          <ac:spMkLst>
+            <pc:docMk/>
+            <pc:sldMk cId="1841269621" sldId="256"/>
+            <ac:spMk id="46" creationId="{201B4B3E-CF4F-41B4-B6AD-ADECC115821C}"/>
+          </ac:spMkLst>
+        </pc:spChg>
+      </pc:sldChg>
+    </pc:docChg>
+  </pc:docChgLst>
+</pc:chgInfo>
+</file>
+
 <file path=ppt/slideLayouts/slideLayout1.xml><?xml version="1.0" encoding="utf-8"?>
 <p:sldLayout xmlns:a="http://schemas.openxmlformats.org/drawingml/2006/main" xmlns:r="http://schemas.openxmlformats.org/officeDocument/2006/relationships" xmlns:p="http://schemas.openxmlformats.org/presentationml/2006/main" type="title" preserve="1">
   <p:cSld name="Title Slide">
@@ -244,7 +281,7 @@
           <a:p>
             <a:fld id="{F10FD4D2-9CFE-4963-A515-BCF3AC927D8A}" type="datetimeFigureOut">
               <a:rPr lang="en-CA" smtClean="0"/>
-              <a:t>2020-07-22</a:t>
+              <a:t>2020-10-12</a:t>
             </a:fld>
             <a:endParaRPr lang="en-CA"/>
           </a:p>
@@ -414,7 +451,7 @@
           <a:p>
             <a:fld id="{F10FD4D2-9CFE-4963-A515-BCF3AC927D8A}" type="datetimeFigureOut">
               <a:rPr lang="en-CA" smtClean="0"/>
-              <a:t>2020-07-22</a:t>
+              <a:t>2020-10-12</a:t>
             </a:fld>
             <a:endParaRPr lang="en-CA"/>
           </a:p>
@@ -594,7 +631,7 @@
           <a:p>
             <a:fld id="{F10FD4D2-9CFE-4963-A515-BCF3AC927D8A}" type="datetimeFigureOut">
               <a:rPr lang="en-CA" smtClean="0"/>
-              <a:t>2020-07-22</a:t>
+              <a:t>2020-10-12</a:t>
             </a:fld>
             <a:endParaRPr lang="en-CA"/>
           </a:p>
@@ -764,7 +801,7 @@
           <a:p>
             <a:fld id="{F10FD4D2-9CFE-4963-A515-BCF3AC927D8A}" type="datetimeFigureOut">
               <a:rPr lang="en-CA" smtClean="0"/>
-              <a:t>2020-07-22</a:t>
+              <a:t>2020-10-12</a:t>
             </a:fld>
             <a:endParaRPr lang="en-CA"/>
           </a:p>
@@ -1010,7 +1047,7 @@
           <a:p>
             <a:fld id="{F10FD4D2-9CFE-4963-A515-BCF3AC927D8A}" type="datetimeFigureOut">
               <a:rPr lang="en-CA" smtClean="0"/>
-              <a:t>2020-07-22</a:t>
+              <a:t>2020-10-12</a:t>
             </a:fld>
             <a:endParaRPr lang="en-CA"/>
           </a:p>
@@ -1242,7 +1279,7 @@
           <a:p>
             <a:fld id="{F10FD4D2-9CFE-4963-A515-BCF3AC927D8A}" type="datetimeFigureOut">
               <a:rPr lang="en-CA" smtClean="0"/>
-              <a:t>2020-07-22</a:t>
+              <a:t>2020-10-12</a:t>
             </a:fld>
             <a:endParaRPr lang="en-CA"/>
           </a:p>
@@ -1609,7 +1646,7 @@
           <a:p>
             <a:fld id="{F10FD4D2-9CFE-4963-A515-BCF3AC927D8A}" type="datetimeFigureOut">
               <a:rPr lang="en-CA" smtClean="0"/>
-              <a:t>2020-07-22</a:t>
+              <a:t>2020-10-12</a:t>
             </a:fld>
             <a:endParaRPr lang="en-CA"/>
           </a:p>
@@ -1727,7 +1764,7 @@
           <a:p>
             <a:fld id="{F10FD4D2-9CFE-4963-A515-BCF3AC927D8A}" type="datetimeFigureOut">
               <a:rPr lang="en-CA" smtClean="0"/>
-              <a:t>2020-07-22</a:t>
+              <a:t>2020-10-12</a:t>
             </a:fld>
             <a:endParaRPr lang="en-CA"/>
           </a:p>
@@ -1822,7 +1859,7 @@
           <a:p>
             <a:fld id="{F10FD4D2-9CFE-4963-A515-BCF3AC927D8A}" type="datetimeFigureOut">
               <a:rPr lang="en-CA" smtClean="0"/>
-              <a:t>2020-07-22</a:t>
+              <a:t>2020-10-12</a:t>
             </a:fld>
             <a:endParaRPr lang="en-CA"/>
           </a:p>
@@ -2099,7 +2136,7 @@
           <a:p>
             <a:fld id="{F10FD4D2-9CFE-4963-A515-BCF3AC927D8A}" type="datetimeFigureOut">
               <a:rPr lang="en-CA" smtClean="0"/>
-              <a:t>2020-07-22</a:t>
+              <a:t>2020-10-12</a:t>
             </a:fld>
             <a:endParaRPr lang="en-CA"/>
           </a:p>
@@ -2352,7 +2389,7 @@
           <a:p>
             <a:fld id="{F10FD4D2-9CFE-4963-A515-BCF3AC927D8A}" type="datetimeFigureOut">
               <a:rPr lang="en-CA" smtClean="0"/>
-              <a:t>2020-07-22</a:t>
+              <a:t>2020-10-12</a:t>
             </a:fld>
             <a:endParaRPr lang="en-CA"/>
           </a:p>
@@ -2565,7 +2602,7 @@
           <a:p>
             <a:fld id="{F10FD4D2-9CFE-4963-A515-BCF3AC927D8A}" type="datetimeFigureOut">
               <a:rPr lang="en-CA" smtClean="0"/>
-              <a:t>2020-07-22</a:t>
+              <a:t>2020-10-12</a:t>
             </a:fld>
             <a:endParaRPr lang="en-CA"/>
           </a:p>
@@ -4328,8 +4365,8 @@
             </p:nvSpPr>
             <p:spPr>
               <a:xfrm>
-                <a:off x="5451103" y="1842339"/>
-                <a:ext cx="6326023" cy="2566215"/>
+                <a:off x="5068323" y="1842339"/>
+                <a:ext cx="7014820" cy="2094612"/>
               </a:xfrm>
               <a:prstGeom prst="rect">
                 <a:avLst/>
@@ -4408,13 +4445,7 @@
                         <a:rPr lang="en-US" sz="1500" b="0" i="1" smtClean="0">
                           <a:latin typeface="Cambria Math" panose="02040503050406030204" pitchFamily="18" charset="0"/>
                         </a:rPr>
-                        <m:t>𝑏</m:t>
-                      </m:r>
-                      <m:r>
-                        <a:rPr lang="en-US" sz="1500" b="0" i="1" smtClean="0">
-                          <a:latin typeface="Cambria Math" panose="02040503050406030204" pitchFamily="18" charset="0"/>
-                        </a:rPr>
-                        <m:t>𝑖𝑜𝑚𝑎𝑠𝑠</m:t>
+                        <m:t>𝑏𝑖𝑜𝑚𝑎𝑠𝑠</m:t>
                       </m:r>
                       <m:r>
                         <a:rPr lang="en-US" sz="1500" b="0" i="1" smtClean="0">
@@ -4951,14 +4982,7 @@
                         <a:latin typeface="Cambria Math" panose="02040503050406030204" pitchFamily="18" charset="0"/>
                         <a:ea typeface="Cambria Math" panose="02040503050406030204" pitchFamily="18" charset="0"/>
                       </a:rPr>
-                      <m:t>×</m:t>
-                    </m:r>
-                    <m:r>
-                      <a:rPr lang="en-US" sz="1500" i="1">
-                        <a:latin typeface="Cambria Math" panose="02040503050406030204" pitchFamily="18" charset="0"/>
-                        <a:ea typeface="Cambria Math" panose="02040503050406030204" pitchFamily="18" charset="0"/>
-                      </a:rPr>
-                      <m:t>3</m:t>
+                      <m:t>×3</m:t>
                     </m:r>
                     <m:r>
                       <a:rPr lang="en-US" sz="1500" b="0" i="1" smtClean="0">
@@ -5032,8 +5056,8 @@
             </p:nvSpPr>
             <p:spPr>
               <a:xfrm>
-                <a:off x="5451103" y="1842339"/>
-                <a:ext cx="6326023" cy="2566215"/>
+                <a:off x="5068323" y="1842339"/>
+                <a:ext cx="7014820" cy="2094612"/>
               </a:xfrm>
               <a:prstGeom prst="rect">
                 <a:avLst/>
@@ -5041,7 +5065,7 @@
               <a:blipFill>
                 <a:blip r:embed="rId2"/>
                 <a:stretch>
-                  <a:fillRect t="-238"/>
+                  <a:fillRect l="-174" t="-291"/>
                 </a:stretch>
               </a:blipFill>
             </p:spPr>
@@ -5090,8 +5114,8 @@
           <a:chExt cx="0" cy="0"/>
         </a:xfrm>
       </p:grpSpPr>
-      <mc:AlternateContent xmlns:mc="http://schemas.openxmlformats.org/markup-compatibility/2006">
-        <mc:Choice xmlns:a14="http://schemas.microsoft.com/office/drawing/2010/main" Requires="a14">
+      <mc:AlternateContent xmlns:mc="http://schemas.openxmlformats.org/markup-compatibility/2006" xmlns:a14="http://schemas.microsoft.com/office/drawing/2010/main">
+        <mc:Choice Requires="a14">
           <p:sp>
             <p:nvSpPr>
               <p:cNvPr id="4" name="TextBox 3">
@@ -5254,6 +5278,7 @@
                 <a:endParaRPr lang="en-CA" sz="1500" dirty="0"/>
               </a:p>
               <a:p>
+                <a:pPr/>
                 <a14:m>
                   <m:oMathPara xmlns:m="http://schemas.openxmlformats.org/officeDocument/2006/math">
                     <m:oMathParaPr>
@@ -5433,260 +5458,6 @@
                           <a:ea typeface="Cambria Math" panose="02040503050406030204" pitchFamily="18" charset="0"/>
                         </a:rPr>
                         <m:t>3</m:t>
-                      </m:r>
-                    </m:oMath>
-                  </m:oMathPara>
-                </a14:m>
-                <a:endParaRPr lang="en-US" sz="1500" b="0" dirty="0">
-                  <a:ea typeface="Cambria Math" panose="02040503050406030204" pitchFamily="18" charset="0"/>
-                </a:endParaRPr>
-              </a:p>
-              <a:p>
-                <a:endParaRPr lang="en-CA" sz="1500" dirty="0"/>
-              </a:p>
-              <a:p>
-                <a:endParaRPr lang="en-CA" sz="1500" dirty="0"/>
-              </a:p>
-              <a:p>
-                <a14:m>
-                  <m:oMathPara xmlns:m="http://schemas.openxmlformats.org/officeDocument/2006/math">
-                    <m:oMathParaPr>
-                      <m:jc m:val="centerGroup"/>
-                    </m:oMathParaPr>
-                    <m:oMath xmlns:m="http://schemas.openxmlformats.org/officeDocument/2006/math">
-                      <m:r>
-                        <a:rPr lang="en-US" sz="1500" b="0" i="1" smtClean="0">
-                          <a:latin typeface="Cambria Math" panose="02040503050406030204" pitchFamily="18" charset="0"/>
-                        </a:rPr>
-                        <m:t>𝑖𝑓</m:t>
-                      </m:r>
-                      <m:r>
-                        <a:rPr lang="en-US" sz="1500" b="0" i="1" smtClean="0">
-                          <a:latin typeface="Cambria Math" panose="02040503050406030204" pitchFamily="18" charset="0"/>
-                        </a:rPr>
-                        <m:t> </m:t>
-                      </m:r>
-                      <m:r>
-                        <a:rPr lang="en-US" sz="1500" b="0" i="1" smtClean="0">
-                          <a:latin typeface="Cambria Math" panose="02040503050406030204" pitchFamily="18" charset="0"/>
-                        </a:rPr>
-                        <m:t>𝑡h𝑒</m:t>
-                      </m:r>
-                      <m:r>
-                        <a:rPr lang="en-US" sz="1500" b="0" i="1" smtClean="0">
-                          <a:latin typeface="Cambria Math" panose="02040503050406030204" pitchFamily="18" charset="0"/>
-                        </a:rPr>
-                        <m:t> </m:t>
-                      </m:r>
-                      <m:r>
-                        <a:rPr lang="en-US" sz="1500" b="0" i="1" smtClean="0">
-                          <a:latin typeface="Cambria Math" panose="02040503050406030204" pitchFamily="18" charset="0"/>
-                        </a:rPr>
-                        <m:t>𝑡𝑟𝑒𝑒</m:t>
-                      </m:r>
-                      <m:r>
-                        <a:rPr lang="en-US" sz="1500" b="0" i="1" smtClean="0">
-                          <a:latin typeface="Cambria Math" panose="02040503050406030204" pitchFamily="18" charset="0"/>
-                        </a:rPr>
-                        <m:t> </m:t>
-                      </m:r>
-                      <m:r>
-                        <a:rPr lang="en-US" sz="1500" b="0" i="1" smtClean="0">
-                          <a:latin typeface="Cambria Math" panose="02040503050406030204" pitchFamily="18" charset="0"/>
-                        </a:rPr>
-                        <m:t>𝑎𝑔𝑒</m:t>
-                      </m:r>
-                      <m:r>
-                        <a:rPr lang="en-US" sz="1500" b="0" i="1" smtClean="0">
-                          <a:latin typeface="Cambria Math" panose="02040503050406030204" pitchFamily="18" charset="0"/>
-                        </a:rPr>
-                        <m:t> </m:t>
-                      </m:r>
-                      <m:r>
-                        <a:rPr lang="en-US" sz="1500" b="0" i="1" smtClean="0">
-                          <a:latin typeface="Cambria Math" panose="02040503050406030204" pitchFamily="18" charset="0"/>
-                        </a:rPr>
-                        <m:t>𝑖𝑛</m:t>
-                      </m:r>
-                      <m:r>
-                        <a:rPr lang="en-US" sz="1500" b="0" i="1" smtClean="0">
-                          <a:latin typeface="Cambria Math" panose="02040503050406030204" pitchFamily="18" charset="0"/>
-                        </a:rPr>
-                        <m:t> 2011 &lt;6:</m:t>
-                      </m:r>
-                    </m:oMath>
-                  </m:oMathPara>
-                </a14:m>
-                <a:endParaRPr lang="en-US" sz="1500" b="0" i="1" dirty="0">
-                  <a:latin typeface="Cambria Math" panose="02040503050406030204" pitchFamily="18" charset="0"/>
-                </a:endParaRPr>
-              </a:p>
-              <a:p>
-                <a14:m>
-                  <m:oMathPara xmlns:m="http://schemas.openxmlformats.org/officeDocument/2006/math">
-                    <m:oMathParaPr>
-                      <m:jc m:val="centerGroup"/>
-                    </m:oMathParaPr>
-                    <m:oMath xmlns:m="http://schemas.openxmlformats.org/officeDocument/2006/math">
-                      <m:r>
-                        <a:rPr lang="en-US" sz="1500" i="1">
-                          <a:latin typeface="Cambria Math" panose="02040503050406030204" pitchFamily="18" charset="0"/>
-                        </a:rPr>
-                        <m:t>𝐵𝑖𝑜𝑚𝑎𝑠𝑠</m:t>
-                      </m:r>
-                      <m:r>
-                        <a:rPr lang="en-US" sz="1500" i="1">
-                          <a:latin typeface="Cambria Math" panose="02040503050406030204" pitchFamily="18" charset="0"/>
-                        </a:rPr>
-                        <m:t> </m:t>
-                      </m:r>
-                      <m:r>
-                        <a:rPr lang="en-US" sz="1500" i="1">
-                          <a:latin typeface="Cambria Math" panose="02040503050406030204" pitchFamily="18" charset="0"/>
-                        </a:rPr>
-                        <m:t>𝑔𝑎𝑖𝑛𝑒𝑑</m:t>
-                      </m:r>
-                      <m:r>
-                        <a:rPr lang="en-US" sz="1500" b="0" i="1" smtClean="0">
-                          <a:latin typeface="Cambria Math" panose="02040503050406030204" pitchFamily="18" charset="0"/>
-                        </a:rPr>
-                        <m:t>=</m:t>
-                      </m:r>
-                      <m:sSub>
-                        <m:sSubPr>
-                          <m:ctrlPr>
-                            <a:rPr lang="en-US" sz="1500" b="0" i="1" smtClean="0">
-                              <a:latin typeface="Cambria Math" panose="02040503050406030204" pitchFamily="18" charset="0"/>
-                            </a:rPr>
-                          </m:ctrlPr>
-                        </m:sSubPr>
-                        <m:e>
-                          <m:r>
-                            <a:rPr lang="en-US" sz="1500" b="0" i="1" smtClean="0">
-                              <a:latin typeface="Cambria Math" panose="02040503050406030204" pitchFamily="18" charset="0"/>
-                            </a:rPr>
-                            <m:t>𝐵𝐴𝐼</m:t>
-                          </m:r>
-                        </m:e>
-                        <m:sub>
-                          <m:r>
-                            <a:rPr lang="en-US" sz="1500" b="0" i="1" smtClean="0">
-                              <a:latin typeface="Cambria Math" panose="02040503050406030204" pitchFamily="18" charset="0"/>
-                            </a:rPr>
-                            <m:t>2011</m:t>
-                          </m:r>
-                        </m:sub>
-                      </m:sSub>
-                      <m:r>
-                        <a:rPr lang="en-US" sz="1500" b="0" i="1" smtClean="0">
-                          <a:latin typeface="Cambria Math" panose="02040503050406030204" pitchFamily="18" charset="0"/>
-                        </a:rPr>
-                        <m:t> </m:t>
-                      </m:r>
-                      <m:r>
-                        <a:rPr lang="en-US" sz="1500" b="0" i="1" smtClean="0">
-                          <a:latin typeface="Cambria Math" panose="02040503050406030204" pitchFamily="18" charset="0"/>
-                          <a:ea typeface="Cambria Math" panose="02040503050406030204" pitchFamily="18" charset="0"/>
-                        </a:rPr>
-                        <m:t>×</m:t>
-                      </m:r>
-                      <m:r>
-                        <a:rPr lang="en-US" sz="1500" b="0" i="1" smtClean="0">
-                          <a:latin typeface="Cambria Math" panose="02040503050406030204" pitchFamily="18" charset="0"/>
-                          <a:ea typeface="Cambria Math" panose="02040503050406030204" pitchFamily="18" charset="0"/>
-                        </a:rPr>
-                        <m:t>𝑠𝑡𝑒𝑚</m:t>
-                      </m:r>
-                      <m:r>
-                        <a:rPr lang="en-US" sz="1500" b="0" i="1" smtClean="0">
-                          <a:latin typeface="Cambria Math" panose="02040503050406030204" pitchFamily="18" charset="0"/>
-                          <a:ea typeface="Cambria Math" panose="02040503050406030204" pitchFamily="18" charset="0"/>
-                        </a:rPr>
-                        <m:t> </m:t>
-                      </m:r>
-                      <m:r>
-                        <a:rPr lang="en-US" sz="1500" b="0" i="1" smtClean="0">
-                          <a:latin typeface="Cambria Math" panose="02040503050406030204" pitchFamily="18" charset="0"/>
-                          <a:ea typeface="Cambria Math" panose="02040503050406030204" pitchFamily="18" charset="0"/>
-                        </a:rPr>
-                        <m:t>𝑤𝑜𝑜𝑑</m:t>
-                      </m:r>
-                      <m:r>
-                        <a:rPr lang="en-US" sz="1500" b="0" i="1" smtClean="0">
-                          <a:latin typeface="Cambria Math" panose="02040503050406030204" pitchFamily="18" charset="0"/>
-                          <a:ea typeface="Cambria Math" panose="02040503050406030204" pitchFamily="18" charset="0"/>
-                        </a:rPr>
-                        <m:t> </m:t>
-                      </m:r>
-                      <m:r>
-                        <a:rPr lang="en-US" sz="1500" b="0" i="1" smtClean="0">
-                          <a:latin typeface="Cambria Math" panose="02040503050406030204" pitchFamily="18" charset="0"/>
-                          <a:ea typeface="Cambria Math" panose="02040503050406030204" pitchFamily="18" charset="0"/>
-                        </a:rPr>
-                        <m:t>𝑑𝑒𝑛𝑠𝑖𝑡𝑦</m:t>
-                      </m:r>
-                      <m:r>
-                        <a:rPr lang="en-US" sz="1500" b="0" i="1" smtClean="0">
-                          <a:latin typeface="Cambria Math" panose="02040503050406030204" pitchFamily="18" charset="0"/>
-                          <a:ea typeface="Cambria Math" panose="02040503050406030204" pitchFamily="18" charset="0"/>
-                        </a:rPr>
-                        <m:t> ×</m:t>
-                      </m:r>
-                      <m:f>
-                        <m:fPr>
-                          <m:ctrlPr>
-                            <a:rPr lang="en-US" sz="1500" b="0" i="1" smtClean="0">
-                              <a:latin typeface="Cambria Math" panose="02040503050406030204" pitchFamily="18" charset="0"/>
-                              <a:ea typeface="Cambria Math" panose="02040503050406030204" pitchFamily="18" charset="0"/>
-                            </a:rPr>
-                          </m:ctrlPr>
-                        </m:fPr>
-                        <m:num>
-                          <m:r>
-                            <a:rPr lang="en-US" sz="1500" b="0" i="1" smtClean="0">
-                              <a:latin typeface="Cambria Math" panose="02040503050406030204" pitchFamily="18" charset="0"/>
-                              <a:ea typeface="Cambria Math" panose="02040503050406030204" pitchFamily="18" charset="0"/>
-                            </a:rPr>
-                            <m:t>h𝑒𝑖𝑔h𝑡</m:t>
-                          </m:r>
-                        </m:num>
-                        <m:den>
-                          <m:r>
-                            <a:rPr lang="en-US" sz="1500" b="0" i="1" smtClean="0">
-                              <a:latin typeface="Cambria Math" panose="02040503050406030204" pitchFamily="18" charset="0"/>
-                              <a:ea typeface="Cambria Math" panose="02040503050406030204" pitchFamily="18" charset="0"/>
-                            </a:rPr>
-                            <m:t>𝑎𝑔𝑒</m:t>
-                          </m:r>
-                        </m:den>
-                      </m:f>
-                      <m:r>
-                        <a:rPr lang="en-US" sz="1500" i="1">
-                          <a:latin typeface="Cambria Math" panose="02040503050406030204" pitchFamily="18" charset="0"/>
-                          <a:ea typeface="Cambria Math" panose="02040503050406030204" pitchFamily="18" charset="0"/>
-                        </a:rPr>
-                        <m:t>×</m:t>
-                      </m:r>
-                      <m:r>
-                        <a:rPr lang="en-US" sz="1500" b="0" i="1" smtClean="0">
-                          <a:latin typeface="Cambria Math" panose="02040503050406030204" pitchFamily="18" charset="0"/>
-                          <a:ea typeface="Cambria Math" panose="02040503050406030204" pitchFamily="18" charset="0"/>
-                        </a:rPr>
-                        <m:t>(</m:t>
-                      </m:r>
-                      <m:r>
-                        <a:rPr lang="en-US" sz="1500" b="0" i="1" smtClean="0">
-                          <a:latin typeface="Cambria Math" panose="02040503050406030204" pitchFamily="18" charset="0"/>
-                          <a:ea typeface="Cambria Math" panose="02040503050406030204" pitchFamily="18" charset="0"/>
-                        </a:rPr>
-                        <m:t>𝑎𝑔𝑒</m:t>
-                      </m:r>
-                      <m:r>
-                        <a:rPr lang="en-US" sz="1500" b="0" i="1" smtClean="0">
-                          <a:latin typeface="Cambria Math" panose="02040503050406030204" pitchFamily="18" charset="0"/>
-                          <a:ea typeface="Cambria Math" panose="02040503050406030204" pitchFamily="18" charset="0"/>
-                        </a:rPr>
-                        <m:t>−1)×3</m:t>
                       </m:r>
                     </m:oMath>
                   </m:oMathPara>
@@ -5767,7 +5538,7 @@
                         <a:rPr lang="en-US" sz="1500" b="0" i="1" smtClean="0">
                           <a:latin typeface="Cambria Math" panose="02040503050406030204" pitchFamily="18" charset="0"/>
                         </a:rPr>
-                        <m:t> 2011 &gt;6:</m:t>
+                        <m:t> 2011 &lt;6:</m:t>
                       </m:r>
                     </m:oMath>
                   </m:oMathPara>
@@ -5811,6 +5582,262 @@
                       <m:sSub>
                         <m:sSubPr>
                           <m:ctrlPr>
+                            <a:rPr lang="en-US" sz="1500" b="0" i="1" smtClean="0">
+                              <a:latin typeface="Cambria Math" panose="02040503050406030204" pitchFamily="18" charset="0"/>
+                            </a:rPr>
+                          </m:ctrlPr>
+                        </m:sSubPr>
+                        <m:e>
+                          <m:r>
+                            <a:rPr lang="en-US" sz="1500" b="0" i="1" smtClean="0">
+                              <a:latin typeface="Cambria Math" panose="02040503050406030204" pitchFamily="18" charset="0"/>
+                            </a:rPr>
+                            <m:t>𝐵𝐴𝐼</m:t>
+                          </m:r>
+                        </m:e>
+                        <m:sub>
+                          <m:r>
+                            <a:rPr lang="en-US" sz="1500" b="0" i="1" smtClean="0">
+                              <a:latin typeface="Cambria Math" panose="02040503050406030204" pitchFamily="18" charset="0"/>
+                            </a:rPr>
+                            <m:t>2011</m:t>
+                          </m:r>
+                        </m:sub>
+                      </m:sSub>
+                      <m:r>
+                        <a:rPr lang="en-US" sz="1500" b="0" i="1" smtClean="0">
+                          <a:latin typeface="Cambria Math" panose="02040503050406030204" pitchFamily="18" charset="0"/>
+                        </a:rPr>
+                        <m:t> </m:t>
+                      </m:r>
+                      <m:r>
+                        <a:rPr lang="en-US" sz="1500" b="0" i="1" smtClean="0">
+                          <a:latin typeface="Cambria Math" panose="02040503050406030204" pitchFamily="18" charset="0"/>
+                          <a:ea typeface="Cambria Math" panose="02040503050406030204" pitchFamily="18" charset="0"/>
+                        </a:rPr>
+                        <m:t>×</m:t>
+                      </m:r>
+                      <m:r>
+                        <a:rPr lang="en-US" sz="1500" b="0" i="1" smtClean="0">
+                          <a:latin typeface="Cambria Math" panose="02040503050406030204" pitchFamily="18" charset="0"/>
+                          <a:ea typeface="Cambria Math" panose="02040503050406030204" pitchFamily="18" charset="0"/>
+                        </a:rPr>
+                        <m:t>𝑠𝑡𝑒𝑚</m:t>
+                      </m:r>
+                      <m:r>
+                        <a:rPr lang="en-US" sz="1500" b="0" i="1" smtClean="0">
+                          <a:latin typeface="Cambria Math" panose="02040503050406030204" pitchFamily="18" charset="0"/>
+                          <a:ea typeface="Cambria Math" panose="02040503050406030204" pitchFamily="18" charset="0"/>
+                        </a:rPr>
+                        <m:t> </m:t>
+                      </m:r>
+                      <m:r>
+                        <a:rPr lang="en-US" sz="1500" b="0" i="1" smtClean="0">
+                          <a:latin typeface="Cambria Math" panose="02040503050406030204" pitchFamily="18" charset="0"/>
+                          <a:ea typeface="Cambria Math" panose="02040503050406030204" pitchFamily="18" charset="0"/>
+                        </a:rPr>
+                        <m:t>𝑤𝑜𝑜𝑑</m:t>
+                      </m:r>
+                      <m:r>
+                        <a:rPr lang="en-US" sz="1500" b="0" i="1" smtClean="0">
+                          <a:latin typeface="Cambria Math" panose="02040503050406030204" pitchFamily="18" charset="0"/>
+                          <a:ea typeface="Cambria Math" panose="02040503050406030204" pitchFamily="18" charset="0"/>
+                        </a:rPr>
+                        <m:t> </m:t>
+                      </m:r>
+                      <m:r>
+                        <a:rPr lang="en-US" sz="1500" b="0" i="1" smtClean="0">
+                          <a:latin typeface="Cambria Math" panose="02040503050406030204" pitchFamily="18" charset="0"/>
+                          <a:ea typeface="Cambria Math" panose="02040503050406030204" pitchFamily="18" charset="0"/>
+                        </a:rPr>
+                        <m:t>𝑑𝑒𝑛𝑠𝑖𝑡𝑦</m:t>
+                      </m:r>
+                      <m:r>
+                        <a:rPr lang="en-US" sz="1500" b="0" i="1" smtClean="0">
+                          <a:latin typeface="Cambria Math" panose="02040503050406030204" pitchFamily="18" charset="0"/>
+                          <a:ea typeface="Cambria Math" panose="02040503050406030204" pitchFamily="18" charset="0"/>
+                        </a:rPr>
+                        <m:t> ×</m:t>
+                      </m:r>
+                      <m:f>
+                        <m:fPr>
+                          <m:ctrlPr>
+                            <a:rPr lang="en-US" sz="1500" b="0" i="1" smtClean="0">
+                              <a:latin typeface="Cambria Math" panose="02040503050406030204" pitchFamily="18" charset="0"/>
+                              <a:ea typeface="Cambria Math" panose="02040503050406030204" pitchFamily="18" charset="0"/>
+                            </a:rPr>
+                          </m:ctrlPr>
+                        </m:fPr>
+                        <m:num>
+                          <m:r>
+                            <a:rPr lang="en-US" sz="1500" b="0" i="1" smtClean="0">
+                              <a:latin typeface="Cambria Math" panose="02040503050406030204" pitchFamily="18" charset="0"/>
+                              <a:ea typeface="Cambria Math" panose="02040503050406030204" pitchFamily="18" charset="0"/>
+                            </a:rPr>
+                            <m:t>h𝑒𝑖𝑔h𝑡</m:t>
+                          </m:r>
+                        </m:num>
+                        <m:den>
+                          <m:r>
+                            <a:rPr lang="en-US" sz="1500" b="0" i="1" smtClean="0">
+                              <a:latin typeface="Cambria Math" panose="02040503050406030204" pitchFamily="18" charset="0"/>
+                              <a:ea typeface="Cambria Math" panose="02040503050406030204" pitchFamily="18" charset="0"/>
+                            </a:rPr>
+                            <m:t>𝑎𝑔𝑒</m:t>
+                          </m:r>
+                        </m:den>
+                      </m:f>
+                      <m:r>
+                        <a:rPr lang="en-US" sz="1500" i="1">
+                          <a:latin typeface="Cambria Math" panose="02040503050406030204" pitchFamily="18" charset="0"/>
+                          <a:ea typeface="Cambria Math" panose="02040503050406030204" pitchFamily="18" charset="0"/>
+                        </a:rPr>
+                        <m:t>×</m:t>
+                      </m:r>
+                      <m:r>
+                        <a:rPr lang="en-US" sz="1500" b="0" i="1" smtClean="0">
+                          <a:latin typeface="Cambria Math" panose="02040503050406030204" pitchFamily="18" charset="0"/>
+                          <a:ea typeface="Cambria Math" panose="02040503050406030204" pitchFamily="18" charset="0"/>
+                        </a:rPr>
+                        <m:t>(</m:t>
+                      </m:r>
+                      <m:r>
+                        <a:rPr lang="en-US" sz="1500" b="0" i="1" smtClean="0">
+                          <a:latin typeface="Cambria Math" panose="02040503050406030204" pitchFamily="18" charset="0"/>
+                          <a:ea typeface="Cambria Math" panose="02040503050406030204" pitchFamily="18" charset="0"/>
+                        </a:rPr>
+                        <m:t>𝑎𝑔𝑒</m:t>
+                      </m:r>
+                      <m:r>
+                        <a:rPr lang="en-US" sz="1500" b="0" i="1" smtClean="0">
+                          <a:latin typeface="Cambria Math" panose="02040503050406030204" pitchFamily="18" charset="0"/>
+                          <a:ea typeface="Cambria Math" panose="02040503050406030204" pitchFamily="18" charset="0"/>
+                        </a:rPr>
+                        <m:t>−1)×3</m:t>
+                      </m:r>
+                    </m:oMath>
+                  </m:oMathPara>
+                </a14:m>
+                <a:endParaRPr lang="en-US" sz="1500" b="0" dirty="0">
+                  <a:ea typeface="Cambria Math" panose="02040503050406030204" pitchFamily="18" charset="0"/>
+                </a:endParaRPr>
+              </a:p>
+              <a:p>
+                <a:endParaRPr lang="en-CA" sz="1500" dirty="0"/>
+              </a:p>
+              <a:p>
+                <a:endParaRPr lang="en-CA" sz="1500" dirty="0"/>
+              </a:p>
+              <a:p>
+                <a:pPr/>
+                <a14:m>
+                  <m:oMathPara xmlns:m="http://schemas.openxmlformats.org/officeDocument/2006/math">
+                    <m:oMathParaPr>
+                      <m:jc m:val="centerGroup"/>
+                    </m:oMathParaPr>
+                    <m:oMath xmlns:m="http://schemas.openxmlformats.org/officeDocument/2006/math">
+                      <m:r>
+                        <a:rPr lang="en-US" sz="1500" b="0" i="1" smtClean="0">
+                          <a:latin typeface="Cambria Math" panose="02040503050406030204" pitchFamily="18" charset="0"/>
+                        </a:rPr>
+                        <m:t>𝑖𝑓</m:t>
+                      </m:r>
+                      <m:r>
+                        <a:rPr lang="en-US" sz="1500" b="0" i="1" smtClean="0">
+                          <a:latin typeface="Cambria Math" panose="02040503050406030204" pitchFamily="18" charset="0"/>
+                        </a:rPr>
+                        <m:t> </m:t>
+                      </m:r>
+                      <m:r>
+                        <a:rPr lang="en-US" sz="1500" b="0" i="1" smtClean="0">
+                          <a:latin typeface="Cambria Math" panose="02040503050406030204" pitchFamily="18" charset="0"/>
+                        </a:rPr>
+                        <m:t>𝑡h𝑒</m:t>
+                      </m:r>
+                      <m:r>
+                        <a:rPr lang="en-US" sz="1500" b="0" i="1" smtClean="0">
+                          <a:latin typeface="Cambria Math" panose="02040503050406030204" pitchFamily="18" charset="0"/>
+                        </a:rPr>
+                        <m:t> </m:t>
+                      </m:r>
+                      <m:r>
+                        <a:rPr lang="en-US" sz="1500" b="0" i="1" smtClean="0">
+                          <a:latin typeface="Cambria Math" panose="02040503050406030204" pitchFamily="18" charset="0"/>
+                        </a:rPr>
+                        <m:t>𝑡𝑟𝑒𝑒</m:t>
+                      </m:r>
+                      <m:r>
+                        <a:rPr lang="en-US" sz="1500" b="0" i="1" smtClean="0">
+                          <a:latin typeface="Cambria Math" panose="02040503050406030204" pitchFamily="18" charset="0"/>
+                        </a:rPr>
+                        <m:t> </m:t>
+                      </m:r>
+                      <m:r>
+                        <a:rPr lang="en-US" sz="1500" b="0" i="1" smtClean="0">
+                          <a:latin typeface="Cambria Math" panose="02040503050406030204" pitchFamily="18" charset="0"/>
+                        </a:rPr>
+                        <m:t>𝑎𝑔𝑒</m:t>
+                      </m:r>
+                      <m:r>
+                        <a:rPr lang="en-US" sz="1500" b="0" i="1" smtClean="0">
+                          <a:latin typeface="Cambria Math" panose="02040503050406030204" pitchFamily="18" charset="0"/>
+                        </a:rPr>
+                        <m:t> </m:t>
+                      </m:r>
+                      <m:r>
+                        <a:rPr lang="en-US" sz="1500" b="0" i="1" smtClean="0">
+                          <a:latin typeface="Cambria Math" panose="02040503050406030204" pitchFamily="18" charset="0"/>
+                        </a:rPr>
+                        <m:t>𝑖𝑛</m:t>
+                      </m:r>
+                      <m:r>
+                        <a:rPr lang="en-US" sz="1500" b="0" i="1" smtClean="0">
+                          <a:latin typeface="Cambria Math" panose="02040503050406030204" pitchFamily="18" charset="0"/>
+                        </a:rPr>
+                        <m:t> 2011 &gt;6:</m:t>
+                      </m:r>
+                    </m:oMath>
+                  </m:oMathPara>
+                </a14:m>
+                <a:endParaRPr lang="en-US" sz="1500" b="0" i="1" dirty="0">
+                  <a:latin typeface="Cambria Math" panose="02040503050406030204" pitchFamily="18" charset="0"/>
+                </a:endParaRPr>
+              </a:p>
+              <a:p>
+                <a:pPr/>
+                <a14:m>
+                  <m:oMathPara xmlns:m="http://schemas.openxmlformats.org/officeDocument/2006/math">
+                    <m:oMathParaPr>
+                      <m:jc m:val="centerGroup"/>
+                    </m:oMathParaPr>
+                    <m:oMath xmlns:m="http://schemas.openxmlformats.org/officeDocument/2006/math">
+                      <m:r>
+                        <a:rPr lang="en-US" sz="1500" i="1">
+                          <a:latin typeface="Cambria Math" panose="02040503050406030204" pitchFamily="18" charset="0"/>
+                        </a:rPr>
+                        <m:t>𝐵𝑖𝑜𝑚𝑎𝑠𝑠</m:t>
+                      </m:r>
+                      <m:r>
+                        <a:rPr lang="en-US" sz="1500" i="1">
+                          <a:latin typeface="Cambria Math" panose="02040503050406030204" pitchFamily="18" charset="0"/>
+                        </a:rPr>
+                        <m:t> </m:t>
+                      </m:r>
+                      <m:r>
+                        <a:rPr lang="en-US" sz="1500" i="1">
+                          <a:latin typeface="Cambria Math" panose="02040503050406030204" pitchFamily="18" charset="0"/>
+                        </a:rPr>
+                        <m:t>𝑔𝑎𝑖𝑛𝑒𝑑</m:t>
+                      </m:r>
+                      <m:r>
+                        <a:rPr lang="en-US" sz="1500" b="0" i="1" smtClean="0">
+                          <a:latin typeface="Cambria Math" panose="02040503050406030204" pitchFamily="18" charset="0"/>
+                        </a:rPr>
+                        <m:t>=</m:t>
+                      </m:r>
+                      <m:sSub>
+                        <m:sSubPr>
+                          <m:ctrlPr>
                             <a:rPr lang="en-US" sz="1500" b="1" i="1" smtClean="0">
                               <a:latin typeface="Cambria Math" panose="02040503050406030204" pitchFamily="18" charset="0"/>
                             </a:rPr>
@@ -5893,7 +5920,6 @@
                 <a:endParaRPr lang="en-US" sz="1500" b="1" dirty="0"/>
               </a:p>
               <a:p>
-                <a:pPr/>
                 <a:endParaRPr lang="en-US" sz="1500" b="0" dirty="0"/>
               </a:p>
               <a:p>
@@ -6091,6 +6117,7 @@
                 </a:endParaRPr>
               </a:p>
               <a:p>
+                <a:pPr/>
                 <a14:m>
                   <m:oMathPara xmlns:m="http://schemas.openxmlformats.org/officeDocument/2006/math">
                     <m:oMathParaPr>
@@ -6413,7 +6440,6 @@
                 </a:endParaRPr>
               </a:p>
               <a:p>
-                <a:pPr/>
                 <a:endParaRPr lang="en-US" sz="1500" b="0" dirty="0">
                   <a:ea typeface="Cambria Math" panose="02040503050406030204" pitchFamily="18" charset="0"/>
                 </a:endParaRPr>
@@ -6424,7 +6450,7 @@
             </p:txBody>
           </p:sp>
         </mc:Choice>
-        <mc:Fallback>
+        <mc:Fallback xmlns="">
           <p:sp>
             <p:nvSpPr>
               <p:cNvPr id="4" name="TextBox 3">

</xml_diff>